<commit_message>
Removendo a secretaria no proto persona
</commit_message>
<xml_diff>
--- a/Documentação/Proto-persona/Proto-Persona.pptx
+++ b/Documentação/Proto-persona/Proto-Persona.pptx
@@ -6,8 +6,7 @@
   </p:sldMasterIdLst>
   <p:sldIdLst>
     <p:sldId id="257" r:id="rId2"/>
-    <p:sldId id="258" r:id="rId3"/>
-    <p:sldId id="259" r:id="rId4"/>
+    <p:sldId id="259" r:id="rId3"/>
   </p:sldIdLst>
   <p:sldSz cx="12192000" cy="6858000"/>
   <p:notesSz cx="6858000" cy="9144000"/>
@@ -243,7 +242,7 @@
           <a:p>
             <a:fld id="{C8057513-FC06-4A4C-A8C4-62176279FB3D}" type="datetimeFigureOut">
               <a:rPr lang="pt-BR" smtClean="0"/>
-              <a:t>01/09/2020</a:t>
+              <a:t>10/09/2020</a:t>
             </a:fld>
             <a:endParaRPr lang="pt-BR"/>
           </a:p>
@@ -411,7 +410,7 @@
           <a:p>
             <a:fld id="{C8057513-FC06-4A4C-A8C4-62176279FB3D}" type="datetimeFigureOut">
               <a:rPr lang="pt-BR" smtClean="0"/>
-              <a:t>01/09/2020</a:t>
+              <a:t>10/09/2020</a:t>
             </a:fld>
             <a:endParaRPr lang="pt-BR"/>
           </a:p>
@@ -589,7 +588,7 @@
           <a:p>
             <a:fld id="{C8057513-FC06-4A4C-A8C4-62176279FB3D}" type="datetimeFigureOut">
               <a:rPr lang="pt-BR" smtClean="0"/>
-              <a:t>01/09/2020</a:t>
+              <a:t>10/09/2020</a:t>
             </a:fld>
             <a:endParaRPr lang="pt-BR"/>
           </a:p>
@@ -757,7 +756,7 @@
           <a:p>
             <a:fld id="{C8057513-FC06-4A4C-A8C4-62176279FB3D}" type="datetimeFigureOut">
               <a:rPr lang="pt-BR" smtClean="0"/>
-              <a:t>01/09/2020</a:t>
+              <a:t>10/09/2020</a:t>
             </a:fld>
             <a:endParaRPr lang="pt-BR"/>
           </a:p>
@@ -1002,7 +1001,7 @@
           <a:p>
             <a:fld id="{C8057513-FC06-4A4C-A8C4-62176279FB3D}" type="datetimeFigureOut">
               <a:rPr lang="pt-BR" smtClean="0"/>
-              <a:t>01/09/2020</a:t>
+              <a:t>10/09/2020</a:t>
             </a:fld>
             <a:endParaRPr lang="pt-BR"/>
           </a:p>
@@ -1231,7 +1230,7 @@
           <a:p>
             <a:fld id="{C8057513-FC06-4A4C-A8C4-62176279FB3D}" type="datetimeFigureOut">
               <a:rPr lang="pt-BR" smtClean="0"/>
-              <a:t>01/09/2020</a:t>
+              <a:t>10/09/2020</a:t>
             </a:fld>
             <a:endParaRPr lang="pt-BR"/>
           </a:p>
@@ -1595,7 +1594,7 @@
           <a:p>
             <a:fld id="{C8057513-FC06-4A4C-A8C4-62176279FB3D}" type="datetimeFigureOut">
               <a:rPr lang="pt-BR" smtClean="0"/>
-              <a:t>01/09/2020</a:t>
+              <a:t>10/09/2020</a:t>
             </a:fld>
             <a:endParaRPr lang="pt-BR"/>
           </a:p>
@@ -1712,7 +1711,7 @@
           <a:p>
             <a:fld id="{C8057513-FC06-4A4C-A8C4-62176279FB3D}" type="datetimeFigureOut">
               <a:rPr lang="pt-BR" smtClean="0"/>
-              <a:t>01/09/2020</a:t>
+              <a:t>10/09/2020</a:t>
             </a:fld>
             <a:endParaRPr lang="pt-BR"/>
           </a:p>
@@ -1807,7 +1806,7 @@
           <a:p>
             <a:fld id="{C8057513-FC06-4A4C-A8C4-62176279FB3D}" type="datetimeFigureOut">
               <a:rPr lang="pt-BR" smtClean="0"/>
-              <a:t>01/09/2020</a:t>
+              <a:t>10/09/2020</a:t>
             </a:fld>
             <a:endParaRPr lang="pt-BR"/>
           </a:p>
@@ -2082,7 +2081,7 @@
           <a:p>
             <a:fld id="{C8057513-FC06-4A4C-A8C4-62176279FB3D}" type="datetimeFigureOut">
               <a:rPr lang="pt-BR" smtClean="0"/>
-              <a:t>01/09/2020</a:t>
+              <a:t>10/09/2020</a:t>
             </a:fld>
             <a:endParaRPr lang="pt-BR"/>
           </a:p>
@@ -2334,7 +2333,7 @@
           <a:p>
             <a:fld id="{C8057513-FC06-4A4C-A8C4-62176279FB3D}" type="datetimeFigureOut">
               <a:rPr lang="pt-BR" smtClean="0"/>
-              <a:t>01/09/2020</a:t>
+              <a:t>10/09/2020</a:t>
             </a:fld>
             <a:endParaRPr lang="pt-BR"/>
           </a:p>
@@ -2545,7 +2544,7 @@
           <a:p>
             <a:fld id="{C8057513-FC06-4A4C-A8C4-62176279FB3D}" type="datetimeFigureOut">
               <a:rPr lang="pt-BR" smtClean="0"/>
-              <a:t>01/09/2020</a:t>
+              <a:t>10/09/2020</a:t>
             </a:fld>
             <a:endParaRPr lang="pt-BR"/>
           </a:p>
@@ -3450,427 +3449,6 @@
         </p:nvSpPr>
         <p:spPr>
           <a:xfrm>
-            <a:off x="2378721" y="2911775"/>
-            <a:ext cx="1491175" cy="646331"/>
-          </a:xfrm>
-          <a:prstGeom prst="rect">
-            <a:avLst/>
-          </a:prstGeom>
-          <a:noFill/>
-        </p:spPr>
-        <p:txBody>
-          <a:bodyPr wrap="square" rtlCol="0">
-            <a:spAutoFit/>
-          </a:bodyPr>
-          <a:lstStyle/>
-          <a:p>
-            <a:r>
-              <a:rPr lang="pt-BR" sz="1800" dirty="0">
-                <a:effectLst/>
-                <a:latin typeface="Arial" panose="020B0604020202020204" pitchFamily="34" charset="0"/>
-                <a:ea typeface="Calibri" panose="020F0502020204030204" pitchFamily="34" charset="0"/>
-                <a:cs typeface="Times New Roman" panose="02020603050405020304" pitchFamily="18" charset="0"/>
-              </a:rPr>
-              <a:t>Priscila</a:t>
-            </a:r>
-            <a:endParaRPr lang="pt-BR" sz="1800" dirty="0">
-              <a:effectLst/>
-              <a:latin typeface="Calibri" panose="020F0502020204030204" pitchFamily="34" charset="0"/>
-              <a:ea typeface="Calibri" panose="020F0502020204030204" pitchFamily="34" charset="0"/>
-              <a:cs typeface="Times New Roman" panose="02020603050405020304" pitchFamily="18" charset="0"/>
-            </a:endParaRPr>
-          </a:p>
-          <a:p>
-            <a:endParaRPr lang="pt-BR" dirty="0"/>
-          </a:p>
-        </p:txBody>
-      </p:sp>
-      <p:sp>
-        <p:nvSpPr>
-          <p:cNvPr id="4" name="CaixaDeTexto 3">
-            <a:extLst>
-              <a:ext uri="{FF2B5EF4-FFF2-40B4-BE49-F238E27FC236}">
-                <a16:creationId xmlns:a16="http://schemas.microsoft.com/office/drawing/2014/main" id="{92A395BB-B936-4484-8871-33236C54A778}"/>
-              </a:ext>
-            </a:extLst>
-          </p:cNvPr>
-          <p:cNvSpPr txBox="1"/>
-          <p:nvPr/>
-        </p:nvSpPr>
-        <p:spPr>
-          <a:xfrm>
-            <a:off x="6248617" y="1033917"/>
-            <a:ext cx="5513158" cy="2308324"/>
-          </a:xfrm>
-          <a:prstGeom prst="rect">
-            <a:avLst/>
-          </a:prstGeom>
-          <a:noFill/>
-        </p:spPr>
-        <p:txBody>
-          <a:bodyPr wrap="square" rtlCol="0">
-            <a:spAutoFit/>
-          </a:bodyPr>
-          <a:lstStyle/>
-          <a:p>
-            <a:pPr marL="285750" indent="-285750">
-              <a:buFont typeface="Arial" panose="020B0604020202020204" pitchFamily="34" charset="0"/>
-              <a:buChar char="•"/>
-            </a:pPr>
-            <a:r>
-              <a:rPr lang="pt-BR" sz="1800" dirty="0">
-                <a:effectLst/>
-                <a:latin typeface="Calibri" panose="020F0502020204030204" pitchFamily="34" charset="0"/>
-                <a:ea typeface="Calibri" panose="020F0502020204030204" pitchFamily="34" charset="0"/>
-                <a:cs typeface="Times New Roman" panose="02020603050405020304" pitchFamily="18" charset="0"/>
-              </a:rPr>
-              <a:t>20 – 50 anos</a:t>
-            </a:r>
-          </a:p>
-          <a:p>
-            <a:pPr marL="285750" indent="-285750">
-              <a:buFont typeface="Arial" panose="020B0604020202020204" pitchFamily="34" charset="0"/>
-              <a:buChar char="•"/>
-            </a:pPr>
-            <a:r>
-              <a:rPr lang="pt-BR" dirty="0">
-                <a:latin typeface="Calibri" panose="020F0502020204030204" pitchFamily="34" charset="0"/>
-                <a:ea typeface="Calibri" panose="020F0502020204030204" pitchFamily="34" charset="0"/>
-                <a:cs typeface="Times New Roman" panose="02020603050405020304" pitchFamily="18" charset="0"/>
-              </a:rPr>
-              <a:t>Possui experiência em administração</a:t>
-            </a:r>
-          </a:p>
-          <a:p>
-            <a:pPr marL="285750" indent="-285750">
-              <a:buFont typeface="Arial" panose="020B0604020202020204" pitchFamily="34" charset="0"/>
-              <a:buChar char="•"/>
-            </a:pPr>
-            <a:r>
-              <a:rPr lang="pt-BR" sz="1800" dirty="0">
-                <a:effectLst/>
-                <a:latin typeface="Calibri" panose="020F0502020204030204" pitchFamily="34" charset="0"/>
-                <a:ea typeface="Calibri" panose="020F0502020204030204" pitchFamily="34" charset="0"/>
-                <a:cs typeface="Times New Roman" panose="02020603050405020304" pitchFamily="18" charset="0"/>
-              </a:rPr>
-              <a:t>Utiliza redes sociais</a:t>
-            </a:r>
-          </a:p>
-          <a:p>
-            <a:pPr marL="285750" indent="-285750">
-              <a:buFont typeface="Arial" panose="020B0604020202020204" pitchFamily="34" charset="0"/>
-              <a:buChar char="•"/>
-            </a:pPr>
-            <a:r>
-              <a:rPr lang="pt-BR" dirty="0">
-                <a:latin typeface="Calibri" panose="020F0502020204030204" pitchFamily="34" charset="0"/>
-                <a:ea typeface="Calibri" panose="020F0502020204030204" pitchFamily="34" charset="0"/>
-                <a:cs typeface="Times New Roman" panose="02020603050405020304" pitchFamily="18" charset="0"/>
-              </a:rPr>
-              <a:t>Mexe no computador frequentemente</a:t>
-            </a:r>
-          </a:p>
-          <a:p>
-            <a:pPr marL="285750" indent="-285750">
-              <a:buFont typeface="Arial" panose="020B0604020202020204" pitchFamily="34" charset="0"/>
-              <a:buChar char="•"/>
-            </a:pPr>
-            <a:r>
-              <a:rPr lang="pt-BR" sz="1800" dirty="0">
-                <a:effectLst/>
-                <a:latin typeface="Calibri" panose="020F0502020204030204" pitchFamily="34" charset="0"/>
-                <a:ea typeface="Calibri" panose="020F0502020204030204" pitchFamily="34" charset="0"/>
-                <a:cs typeface="Times New Roman" panose="02020603050405020304" pitchFamily="18" charset="0"/>
-              </a:rPr>
-              <a:t>Utiliza o Pacote Office</a:t>
-            </a:r>
-          </a:p>
-          <a:p>
-            <a:pPr marL="285750" indent="-285750">
-              <a:buFont typeface="Arial" panose="020B0604020202020204" pitchFamily="34" charset="0"/>
-              <a:buChar char="•"/>
-            </a:pPr>
-            <a:r>
-              <a:rPr lang="pt-BR" dirty="0">
-                <a:latin typeface="Calibri" panose="020F0502020204030204" pitchFamily="34" charset="0"/>
-                <a:ea typeface="Calibri" panose="020F0502020204030204" pitchFamily="34" charset="0"/>
-                <a:cs typeface="Times New Roman" panose="02020603050405020304" pitchFamily="18" charset="0"/>
-              </a:rPr>
-              <a:t>Recebe e realiza ligações</a:t>
-            </a:r>
-          </a:p>
-          <a:p>
-            <a:pPr marL="285750" indent="-285750">
-              <a:buFont typeface="Arial" panose="020B0604020202020204" pitchFamily="34" charset="0"/>
-              <a:buChar char="•"/>
-            </a:pPr>
-            <a:r>
-              <a:rPr lang="pt-BR" sz="1800" dirty="0">
-                <a:effectLst/>
-                <a:latin typeface="Calibri" panose="020F0502020204030204" pitchFamily="34" charset="0"/>
-                <a:ea typeface="Calibri" panose="020F0502020204030204" pitchFamily="34" charset="0"/>
-                <a:cs typeface="Times New Roman" panose="02020603050405020304" pitchFamily="18" charset="0"/>
-              </a:rPr>
-              <a:t>Conectada (mas não </a:t>
-            </a:r>
-            <a:r>
-              <a:rPr lang="pt-BR" sz="1800" dirty="0" err="1">
-                <a:effectLst/>
-                <a:latin typeface="Calibri" panose="020F0502020204030204" pitchFamily="34" charset="0"/>
-                <a:ea typeface="Calibri" panose="020F0502020204030204" pitchFamily="34" charset="0"/>
-                <a:cs typeface="Times New Roman" panose="02020603050405020304" pitchFamily="18" charset="0"/>
-              </a:rPr>
-              <a:t>early-adopter</a:t>
-            </a:r>
-            <a:r>
-              <a:rPr lang="pt-BR" sz="1800" dirty="0">
-                <a:effectLst/>
-                <a:latin typeface="Calibri" panose="020F0502020204030204" pitchFamily="34" charset="0"/>
-                <a:ea typeface="Calibri" panose="020F0502020204030204" pitchFamily="34" charset="0"/>
-                <a:cs typeface="Times New Roman" panose="02020603050405020304" pitchFamily="18" charset="0"/>
-              </a:rPr>
-              <a:t>)</a:t>
-            </a:r>
-          </a:p>
-          <a:p>
-            <a:endParaRPr lang="pt-BR" dirty="0"/>
-          </a:p>
-        </p:txBody>
-      </p:sp>
-      <p:sp>
-        <p:nvSpPr>
-          <p:cNvPr id="6" name="CaixaDeTexto 5">
-            <a:extLst>
-              <a:ext uri="{FF2B5EF4-FFF2-40B4-BE49-F238E27FC236}">
-                <a16:creationId xmlns:a16="http://schemas.microsoft.com/office/drawing/2014/main" id="{DF2FA8EF-2AE4-48DA-BB32-92064C00C82D}"/>
-              </a:ext>
-            </a:extLst>
-          </p:cNvPr>
-          <p:cNvSpPr txBox="1"/>
-          <p:nvPr/>
-        </p:nvSpPr>
-        <p:spPr>
-          <a:xfrm>
-            <a:off x="682450" y="4337115"/>
-            <a:ext cx="9866280" cy="2031325"/>
-          </a:xfrm>
-          <a:prstGeom prst="rect">
-            <a:avLst/>
-          </a:prstGeom>
-          <a:noFill/>
-        </p:spPr>
-        <p:txBody>
-          <a:bodyPr wrap="square" rtlCol="0">
-            <a:spAutoFit/>
-          </a:bodyPr>
-          <a:lstStyle/>
-          <a:p>
-            <a:pPr marL="285750" indent="-285750">
-              <a:buFont typeface="Arial" panose="020B0604020202020204" pitchFamily="34" charset="0"/>
-              <a:buChar char="•"/>
-            </a:pPr>
-            <a:r>
-              <a:rPr lang="pt-BR" dirty="0"/>
-              <a:t>Necessita de um sistema intuitivo </a:t>
-            </a:r>
-          </a:p>
-          <a:p>
-            <a:pPr marL="285750" indent="-285750">
-              <a:buFont typeface="Arial" panose="020B0604020202020204" pitchFamily="34" charset="0"/>
-              <a:buChar char="•"/>
-            </a:pPr>
-            <a:r>
-              <a:rPr lang="pt-BR" dirty="0"/>
-              <a:t>Não gosta de softwares lentos </a:t>
-            </a:r>
-          </a:p>
-          <a:p>
-            <a:pPr marL="285750" indent="-285750">
-              <a:buFont typeface="Arial" panose="020B0604020202020204" pitchFamily="34" charset="0"/>
-              <a:buChar char="•"/>
-            </a:pPr>
-            <a:r>
-              <a:rPr lang="pt-BR" dirty="0"/>
-              <a:t>Necessidade de um treinamento para utilizar softwares</a:t>
-            </a:r>
-          </a:p>
-          <a:p>
-            <a:pPr marL="285750" indent="-285750">
-              <a:buFont typeface="Arial" panose="020B0604020202020204" pitchFamily="34" charset="0"/>
-              <a:buChar char="•"/>
-            </a:pPr>
-            <a:r>
-              <a:rPr lang="pt-BR" dirty="0"/>
-              <a:t>Precisa de facilidade ao abrir um chamado</a:t>
-            </a:r>
-          </a:p>
-          <a:p>
-            <a:pPr marL="285750" indent="-285750">
-              <a:buFont typeface="Arial" panose="020B0604020202020204" pitchFamily="34" charset="0"/>
-              <a:buChar char="•"/>
-            </a:pPr>
-            <a:r>
-              <a:rPr lang="pt-BR" dirty="0"/>
-              <a:t>Não entende de softwares e hardwares</a:t>
-            </a:r>
-          </a:p>
-          <a:p>
-            <a:endParaRPr lang="pt-BR" dirty="0"/>
-          </a:p>
-          <a:p>
-            <a:pPr marL="285750" indent="-285750">
-              <a:buFont typeface="Arial" panose="020B0604020202020204" pitchFamily="34" charset="0"/>
-              <a:buChar char="•"/>
-            </a:pPr>
-            <a:endParaRPr lang="pt-BR" dirty="0"/>
-          </a:p>
-        </p:txBody>
-      </p:sp>
-      <p:sp>
-        <p:nvSpPr>
-          <p:cNvPr id="5" name="CaixaDeTexto 4">
-            <a:extLst>
-              <a:ext uri="{FF2B5EF4-FFF2-40B4-BE49-F238E27FC236}">
-                <a16:creationId xmlns:a16="http://schemas.microsoft.com/office/drawing/2014/main" id="{92760960-EA13-48FB-8910-349058050523}"/>
-              </a:ext>
-            </a:extLst>
-          </p:cNvPr>
-          <p:cNvSpPr txBox="1"/>
-          <p:nvPr/>
-        </p:nvSpPr>
-        <p:spPr>
-          <a:xfrm>
-            <a:off x="301222" y="1736052"/>
-            <a:ext cx="1621953" cy="646331"/>
-          </a:xfrm>
-          <a:prstGeom prst="rect">
-            <a:avLst/>
-          </a:prstGeom>
-          <a:noFill/>
-        </p:spPr>
-        <p:txBody>
-          <a:bodyPr wrap="square" rtlCol="0">
-            <a:spAutoFit/>
-          </a:bodyPr>
-          <a:lstStyle/>
-          <a:p>
-            <a:r>
-              <a:rPr lang="pt-BR" sz="1800" b="1" dirty="0">
-                <a:effectLst/>
-                <a:latin typeface="Arial" panose="020B0604020202020204" pitchFamily="34" charset="0"/>
-                <a:ea typeface="Calibri" panose="020F0502020204030204" pitchFamily="34" charset="0"/>
-                <a:cs typeface="Times New Roman" panose="02020603050405020304" pitchFamily="18" charset="0"/>
-              </a:rPr>
-              <a:t>Secretário(a)</a:t>
-            </a:r>
-            <a:endParaRPr lang="pt-BR" sz="1800" b="1" dirty="0">
-              <a:effectLst/>
-              <a:latin typeface="Calibri" panose="020F0502020204030204" pitchFamily="34" charset="0"/>
-              <a:ea typeface="Calibri" panose="020F0502020204030204" pitchFamily="34" charset="0"/>
-              <a:cs typeface="Times New Roman" panose="02020603050405020304" pitchFamily="18" charset="0"/>
-            </a:endParaRPr>
-          </a:p>
-          <a:p>
-            <a:endParaRPr lang="pt-BR" dirty="0"/>
-          </a:p>
-        </p:txBody>
-      </p:sp>
-      <p:pic>
-        <p:nvPicPr>
-          <p:cNvPr id="8" name="Imagem 7">
-            <a:extLst>
-              <a:ext uri="{FF2B5EF4-FFF2-40B4-BE49-F238E27FC236}">
-                <a16:creationId xmlns:a16="http://schemas.microsoft.com/office/drawing/2014/main" id="{878D285A-6640-416E-9EC6-F2B18ACFC642}"/>
-              </a:ext>
-            </a:extLst>
-          </p:cNvPr>
-          <p:cNvPicPr/>
-          <p:nvPr/>
-        </p:nvPicPr>
-        <p:blipFill>
-          <a:blip r:embed="rId3"/>
-          <a:stretch>
-            <a:fillRect/>
-          </a:stretch>
-        </p:blipFill>
-        <p:spPr>
-          <a:xfrm>
-            <a:off x="1923175" y="895165"/>
-            <a:ext cx="2145241" cy="1954052"/>
-          </a:xfrm>
-          <a:prstGeom prst="rect">
-            <a:avLst/>
-          </a:prstGeom>
-        </p:spPr>
-      </p:pic>
-    </p:spTree>
-    <p:extLst>
-      <p:ext uri="{BB962C8B-B14F-4D97-AF65-F5344CB8AC3E}">
-        <p14:creationId xmlns:p14="http://schemas.microsoft.com/office/powerpoint/2010/main" val="1917308277"/>
-      </p:ext>
-    </p:extLst>
-  </p:cSld>
-  <p:clrMapOvr>
-    <a:masterClrMapping/>
-  </p:clrMapOvr>
-</p:sld>
-</file>
-
-<file path=ppt/slides/slide3.xml><?xml version="1.0" encoding="utf-8"?>
-<p:sld xmlns:a="http://schemas.openxmlformats.org/drawingml/2006/main" xmlns:r="http://schemas.openxmlformats.org/officeDocument/2006/relationships" xmlns:p="http://schemas.openxmlformats.org/presentationml/2006/main">
-  <p:cSld>
-    <p:spTree>
-      <p:nvGrpSpPr>
-        <p:cNvPr id="1" name=""/>
-        <p:cNvGrpSpPr/>
-        <p:nvPr/>
-      </p:nvGrpSpPr>
-      <p:grpSpPr>
-        <a:xfrm>
-          <a:off x="0" y="0"/>
-          <a:ext cx="0" cy="0"/>
-          <a:chOff x="0" y="0"/>
-          <a:chExt cx="0" cy="0"/>
-        </a:xfrm>
-      </p:grpSpPr>
-      <p:pic>
-        <p:nvPicPr>
-          <p:cNvPr id="11" name="Imagem 10"/>
-          <p:cNvPicPr>
-            <a:picLocks noChangeAspect="1"/>
-          </p:cNvPicPr>
-          <p:nvPr/>
-        </p:nvPicPr>
-        <p:blipFill>
-          <a:blip r:embed="rId2"/>
-          <a:stretch>
-            <a:fillRect/>
-          </a:stretch>
-        </p:blipFill>
-        <p:spPr>
-          <a:xfrm>
-            <a:off x="0" y="418012"/>
-            <a:ext cx="11960558" cy="6126479"/>
-          </a:xfrm>
-          <a:prstGeom prst="rect">
-            <a:avLst/>
-          </a:prstGeom>
-        </p:spPr>
-      </p:pic>
-      <p:sp>
-        <p:nvSpPr>
-          <p:cNvPr id="2" name="CaixaDeTexto 1">
-            <a:extLst>
-              <a:ext uri="{FF2B5EF4-FFF2-40B4-BE49-F238E27FC236}">
-                <a16:creationId xmlns:a16="http://schemas.microsoft.com/office/drawing/2014/main" id="{7BC3D3A6-3986-4E7B-B821-AEC05CAB1463}"/>
-              </a:ext>
-            </a:extLst>
-          </p:cNvPr>
-          <p:cNvSpPr txBox="1"/>
-          <p:nvPr/>
-        </p:nvSpPr>
-        <p:spPr>
-          <a:xfrm>
             <a:off x="2471486" y="2890088"/>
             <a:ext cx="1491175" cy="646331"/>
           </a:xfrm>

</xml_diff>